<commit_message>
Docs: developer guide undo redo
</commit_message>
<xml_diff>
--- a/docs/diagrams/UndoRedoExecuteUndoStateListDiagram.pptx
+++ b/docs/diagrams/UndoRedoExecuteUndoStateListDiagram.pptx
@@ -3361,8 +3361,8 @@
         </p:nvSpPr>
         <p:spPr>
           <a:xfrm>
-            <a:off x="5890055" y="4704348"/>
-            <a:ext cx="5504846" cy="646331"/>
+            <a:off x="5890055" y="5596446"/>
+            <a:ext cx="5504846" cy="923330"/>
           </a:xfrm>
           <a:prstGeom prst="rect">
             <a:avLst/>
@@ -3403,8 +3403,13 @@
             <a:pPr algn="ctr"/>
             <a:r>
               <a:rPr lang="en-SG" dirty="0"/>
-              <a:t>The state of the card collection (before ‘add f/Hello …’ was executed) will be restored to state cc1.</a:t>
-            </a:r>
+              <a:t>The state of the card collection (before ‘add f/Hello …’ was executed) will be restored to </a:t>
+            </a:r>
+            <a:r>
+              <a:rPr lang="en-SG"/>
+              <a:t>state cc1 and ch2 is returned.</a:t>
+            </a:r>
+            <a:endParaRPr lang="en-SG" dirty="0"/>
           </a:p>
         </p:txBody>
       </p:sp>
@@ -3496,122 +3501,56 @@
           </a:p>
         </p:txBody>
       </p:sp>
-      <p:graphicFrame>
-        <p:nvGraphicFramePr>
-          <p:cNvPr id="18" name="Table 17">
-            <a:extLst>
-              <a:ext uri="{FF2B5EF4-FFF2-40B4-BE49-F238E27FC236}">
-                <a16:creationId xmlns:a16="http://schemas.microsoft.com/office/drawing/2014/main" id="{F545FAB8-F1CE-4886-9BDE-E772BCB0A9C4}"/>
-              </a:ext>
-            </a:extLst>
-          </p:cNvPr>
-          <p:cNvGraphicFramePr>
-            <a:graphicFrameLocks noGrp="1"/>
-          </p:cNvGraphicFramePr>
-          <p:nvPr>
-            <p:extLst>
-              <p:ext uri="{D42A27DB-BD31-4B8C-83A1-F6EECF244321}">
-                <p14:modId xmlns:p14="http://schemas.microsoft.com/office/powerpoint/2010/main" val="2134298809"/>
-              </p:ext>
-            </p:extLst>
-          </p:nvPr>
-        </p:nvGraphicFramePr>
-        <p:xfrm>
-          <a:off x="473240" y="1476102"/>
-          <a:ext cx="1926000" cy="417888"/>
-        </p:xfrm>
-        <a:graphic>
-          <a:graphicData uri="http://schemas.openxmlformats.org/drawingml/2006/table">
-            <a:tbl>
-              <a:tblPr>
-                <a:tableStyleId>{638B1855-1B75-4FBE-930C-398BA8C253C6}</a:tableStyleId>
-              </a:tblPr>
-              <a:tblGrid>
-                <a:gridCol w="1926000">
-                  <a:extLst>
-                    <a:ext uri="{9D8B030D-6E8A-4147-A177-3AD203B41FA5}">
-                      <a16:colId xmlns:a16="http://schemas.microsoft.com/office/drawing/2014/main" val="4240773277"/>
-                    </a:ext>
-                  </a:extLst>
-                </a:gridCol>
-              </a:tblGrid>
-              <a:tr h="417888">
-                <a:tc>
-                  <a:txBody>
-                    <a:bodyPr/>
-                    <a:lstStyle/>
-                    <a:p>
-                      <a:r>
-                        <a:rPr lang="en-SG" u="sng" dirty="0"/>
-                        <a:t>cc1:CardCollection</a:t>
-                      </a:r>
-                      <a:endParaRPr lang="en-SG" sz="1600" u="sng" dirty="0"/>
-                    </a:p>
-                  </a:txBody>
-                  <a:tcPr/>
-                </a:tc>
-                <a:extLst>
-                  <a:ext uri="{0D108BD9-81ED-4DB2-BD59-A6C34878D82A}">
-                    <a16:rowId xmlns:a16="http://schemas.microsoft.com/office/drawing/2014/main" val="2194462629"/>
-                  </a:ext>
-                </a:extLst>
-              </a:tr>
-            </a:tbl>
-          </a:graphicData>
-        </a:graphic>
-      </p:graphicFrame>
-      <p:sp>
-        <p:nvSpPr>
-          <p:cNvPr id="28" name="Rectangle 27"/>
-          <p:cNvSpPr/>
+      <p:cxnSp>
+        <p:nvCxnSpPr>
+          <p:cNvPr id="19" name="Straight Arrow Connector 18">
+            <a:extLst>
+              <a:ext uri="{FF2B5EF4-FFF2-40B4-BE49-F238E27FC236}">
+                <a16:creationId xmlns:a16="http://schemas.microsoft.com/office/drawing/2014/main" id="{DC8F2CFA-FFF8-41BD-B884-8ACDF8C96486}"/>
+              </a:ext>
+            </a:extLst>
+          </p:cNvPr>
+          <p:cNvCxnSpPr>
+            <a:cxnSpLocks/>
+          </p:cNvCxnSpPr>
           <p:nvPr/>
-        </p:nvSpPr>
+        </p:nvCxnSpPr>
         <p:spPr>
-          <a:xfrm>
-            <a:off x="364797" y="1375953"/>
-            <a:ext cx="11364686" cy="618187"/>
+          <a:xfrm flipV="1">
+            <a:off x="5377343" y="2019157"/>
+            <a:ext cx="0" cy="706873"/>
           </a:xfrm>
-          <a:prstGeom prst="rect">
+          <a:prstGeom prst="straightConnector1">
             <a:avLst/>
           </a:prstGeom>
-          <a:noFill/>
           <a:ln>
             <a:solidFill>
-              <a:schemeClr val="tx1"/>
+              <a:srgbClr val="C00000"/>
             </a:solidFill>
+            <a:tailEnd type="triangle"/>
           </a:ln>
         </p:spPr>
         <p:style>
-          <a:lnRef idx="2">
-            <a:schemeClr val="accent1">
-              <a:shade val="50000"/>
-            </a:schemeClr>
+          <a:lnRef idx="1">
+            <a:schemeClr val="accent1"/>
           </a:lnRef>
-          <a:fillRef idx="1">
+          <a:fillRef idx="0">
             <a:schemeClr val="accent1"/>
           </a:fillRef>
           <a:effectRef idx="0">
             <a:schemeClr val="accent1"/>
           </a:effectRef>
           <a:fontRef idx="minor">
-            <a:schemeClr val="lt1"/>
+            <a:schemeClr val="tx1"/>
           </a:fontRef>
         </p:style>
-        <p:txBody>
-          <a:bodyPr rtlCol="0" anchor="ctr"/>
-          <a:lstStyle/>
-          <a:p>
-            <a:pPr algn="ctr"/>
-            <a:endParaRPr lang="en-US"/>
-          </a:p>
-        </p:txBody>
-      </p:sp>
-      <p:sp>
-        <p:nvSpPr>
-          <p:cNvPr id="29" name="TextBox 28">
-            <a:extLst>
-              <a:ext uri="{FF2B5EF4-FFF2-40B4-BE49-F238E27FC236}">
-                <a16:creationId xmlns:a16="http://schemas.microsoft.com/office/drawing/2014/main" id="{3151A13B-9509-43FA-BFEB-1D9866A00B84}"/>
+      </p:cxnSp>
+      <p:sp>
+        <p:nvSpPr>
+          <p:cNvPr id="47" name="TextBox 46">
+            <a:extLst>
+              <a:ext uri="{FF2B5EF4-FFF2-40B4-BE49-F238E27FC236}">
+                <a16:creationId xmlns:a16="http://schemas.microsoft.com/office/drawing/2014/main" id="{C0941BE8-0A8C-B947-8A90-813A068476DF}"/>
               </a:ext>
             </a:extLst>
           </p:cNvPr>
@@ -3620,7 +3559,7 @@
         </p:nvSpPr>
         <p:spPr>
           <a:xfrm>
-            <a:off x="1939992" y="5234888"/>
+            <a:off x="1875766" y="5914907"/>
             <a:ext cx="3207000" cy="369332"/>
           </a:xfrm>
           <a:prstGeom prst="rect">
@@ -3652,13 +3591,19 @@
       </p:sp>
       <p:sp>
         <p:nvSpPr>
-          <p:cNvPr id="38" name="Rectangle 37"/>
+          <p:cNvPr id="48" name="Rectangle 47">
+            <a:extLst>
+              <a:ext uri="{FF2B5EF4-FFF2-40B4-BE49-F238E27FC236}">
+                <a16:creationId xmlns:a16="http://schemas.microsoft.com/office/drawing/2014/main" id="{1BE33B2E-461A-304C-BE87-34E26B1968FB}"/>
+              </a:ext>
+            </a:extLst>
+          </p:cNvPr>
           <p:cNvSpPr/>
           <p:nvPr/>
         </p:nvSpPr>
         <p:spPr>
           <a:xfrm>
-            <a:off x="387404" y="3838574"/>
+            <a:off x="387404" y="4630307"/>
             <a:ext cx="11364686" cy="593918"/>
           </a:xfrm>
           <a:prstGeom prst="rect">
@@ -3698,10 +3643,10 @@
       </p:sp>
       <p:graphicFrame>
         <p:nvGraphicFramePr>
-          <p:cNvPr id="16" name="Table 15">
-            <a:extLst>
-              <a:ext uri="{FF2B5EF4-FFF2-40B4-BE49-F238E27FC236}">
-                <a16:creationId xmlns:a16="http://schemas.microsoft.com/office/drawing/2014/main" id="{F545FAB8-F1CE-4886-9BDE-E772BCB0A9C4}"/>
+          <p:cNvPr id="49" name="Table 48">
+            <a:extLst>
+              <a:ext uri="{FF2B5EF4-FFF2-40B4-BE49-F238E27FC236}">
+                <a16:creationId xmlns:a16="http://schemas.microsoft.com/office/drawing/2014/main" id="{BB06AABA-2777-E44A-9A4C-C2BA4B98F25E}"/>
               </a:ext>
             </a:extLst>
           </p:cNvPr>
@@ -3711,13 +3656,77 @@
           <p:nvPr>
             <p:extLst>
               <p:ext uri="{D42A27DB-BD31-4B8C-83A1-F6EECF244321}">
-                <p14:modId xmlns:p14="http://schemas.microsoft.com/office/powerpoint/2010/main" val="3795583603"/>
+                <p14:modId xmlns:p14="http://schemas.microsoft.com/office/powerpoint/2010/main" val="1792979045"/>
               </p:ext>
             </p:extLst>
           </p:nvPr>
         </p:nvGraphicFramePr>
         <p:xfrm>
-          <a:off x="2440458" y="1476102"/>
+          <a:off x="4551264" y="4718322"/>
+          <a:ext cx="1926000" cy="417888"/>
+        </p:xfrm>
+        <a:graphic>
+          <a:graphicData uri="http://schemas.openxmlformats.org/drawingml/2006/table">
+            <a:tbl>
+              <a:tblPr>
+                <a:tableStyleId>{638B1855-1B75-4FBE-930C-398BA8C253C6}</a:tableStyleId>
+              </a:tblPr>
+              <a:tblGrid>
+                <a:gridCol w="1926000">
+                  <a:extLst>
+                    <a:ext uri="{9D8B030D-6E8A-4147-A177-3AD203B41FA5}">
+                      <a16:colId xmlns:a16="http://schemas.microsoft.com/office/drawing/2014/main" val="4240773277"/>
+                    </a:ext>
+                  </a:extLst>
+                </a:gridCol>
+              </a:tblGrid>
+              <a:tr h="417888">
+                <a:tc>
+                  <a:txBody>
+                    <a:bodyPr/>
+                    <a:lstStyle/>
+                    <a:p>
+                      <a:r>
+                        <a:rPr lang="en-SG" u="sng" dirty="0"/>
+                        <a:t>cc2:CardCollection</a:t>
+                      </a:r>
+                      <a:endParaRPr lang="en-SG" sz="1600" u="sng" dirty="0"/>
+                    </a:p>
+                  </a:txBody>
+                  <a:tcPr/>
+                </a:tc>
+                <a:extLst>
+                  <a:ext uri="{0D108BD9-81ED-4DB2-BD59-A6C34878D82A}">
+                    <a16:rowId xmlns:a16="http://schemas.microsoft.com/office/drawing/2014/main" val="2194462629"/>
+                  </a:ext>
+                </a:extLst>
+              </a:tr>
+            </a:tbl>
+          </a:graphicData>
+        </a:graphic>
+      </p:graphicFrame>
+      <p:graphicFrame>
+        <p:nvGraphicFramePr>
+          <p:cNvPr id="50" name="Table 49">
+            <a:extLst>
+              <a:ext uri="{FF2B5EF4-FFF2-40B4-BE49-F238E27FC236}">
+                <a16:creationId xmlns:a16="http://schemas.microsoft.com/office/drawing/2014/main" id="{4A26A99A-43B9-824A-931F-D6CB4009AD4D}"/>
+              </a:ext>
+            </a:extLst>
+          </p:cNvPr>
+          <p:cNvGraphicFramePr>
+            <a:graphicFrameLocks noGrp="1"/>
+          </p:cNvGraphicFramePr>
+          <p:nvPr>
+            <p:extLst>
+              <p:ext uri="{D42A27DB-BD31-4B8C-83A1-F6EECF244321}">
+                <p14:modId xmlns:p14="http://schemas.microsoft.com/office/powerpoint/2010/main" val="478218802"/>
+              </p:ext>
+            </p:extLst>
+          </p:nvPr>
+        </p:nvGraphicFramePr>
+        <p:xfrm>
+          <a:off x="2512252" y="4700183"/>
           <a:ext cx="1926000" cy="417888"/>
         </p:xfrm>
         <a:graphic>
@@ -3762,10 +3771,10 @@
       </p:graphicFrame>
       <p:graphicFrame>
         <p:nvGraphicFramePr>
-          <p:cNvPr id="20" name="Table 19">
-            <a:extLst>
-              <a:ext uri="{FF2B5EF4-FFF2-40B4-BE49-F238E27FC236}">
-                <a16:creationId xmlns:a16="http://schemas.microsoft.com/office/drawing/2014/main" id="{F545FAB8-F1CE-4886-9BDE-E772BCB0A9C4}"/>
+          <p:cNvPr id="51" name="Table 50">
+            <a:extLst>
+              <a:ext uri="{FF2B5EF4-FFF2-40B4-BE49-F238E27FC236}">
+                <a16:creationId xmlns:a16="http://schemas.microsoft.com/office/drawing/2014/main" id="{037CCA92-9198-7A43-BF35-5AD564969244}"/>
               </a:ext>
             </a:extLst>
           </p:cNvPr>
@@ -3775,13 +3784,709 @@
           <p:nvPr>
             <p:extLst>
               <p:ext uri="{D42A27DB-BD31-4B8C-83A1-F6EECF244321}">
-                <p14:modId xmlns:p14="http://schemas.microsoft.com/office/powerpoint/2010/main" val="2140900031"/>
+                <p14:modId xmlns:p14="http://schemas.microsoft.com/office/powerpoint/2010/main" val="868030701"/>
               </p:ext>
             </p:extLst>
           </p:nvPr>
         </p:nvGraphicFramePr>
         <p:xfrm>
-          <a:off x="4409785" y="1476102"/>
+          <a:off x="473240" y="4700183"/>
+          <a:ext cx="1926000" cy="417888"/>
+        </p:xfrm>
+        <a:graphic>
+          <a:graphicData uri="http://schemas.openxmlformats.org/drawingml/2006/table">
+            <a:tbl>
+              <a:tblPr>
+                <a:tableStyleId>{638B1855-1B75-4FBE-930C-398BA8C253C6}</a:tableStyleId>
+              </a:tblPr>
+              <a:tblGrid>
+                <a:gridCol w="1926000">
+                  <a:extLst>
+                    <a:ext uri="{9D8B030D-6E8A-4147-A177-3AD203B41FA5}">
+                      <a16:colId xmlns:a16="http://schemas.microsoft.com/office/drawing/2014/main" val="4240773277"/>
+                    </a:ext>
+                  </a:extLst>
+                </a:gridCol>
+              </a:tblGrid>
+              <a:tr h="417888">
+                <a:tc>
+                  <a:txBody>
+                    <a:bodyPr/>
+                    <a:lstStyle/>
+                    <a:p>
+                      <a:r>
+                        <a:rPr lang="en-SG" u="sng" dirty="0"/>
+                        <a:t>cc0:CardCollection</a:t>
+                      </a:r>
+                      <a:endParaRPr lang="en-SG" sz="1600" u="sng" dirty="0"/>
+                    </a:p>
+                  </a:txBody>
+                  <a:tcPr/>
+                </a:tc>
+                <a:extLst>
+                  <a:ext uri="{0D108BD9-81ED-4DB2-BD59-A6C34878D82A}">
+                    <a16:rowId xmlns:a16="http://schemas.microsoft.com/office/drawing/2014/main" val="2194462629"/>
+                  </a:ext>
+                </a:extLst>
+              </a:tr>
+            </a:tbl>
+          </a:graphicData>
+        </a:graphic>
+      </p:graphicFrame>
+      <p:cxnSp>
+        <p:nvCxnSpPr>
+          <p:cNvPr id="52" name="Straight Arrow Connector 51">
+            <a:extLst>
+              <a:ext uri="{FF2B5EF4-FFF2-40B4-BE49-F238E27FC236}">
+                <a16:creationId xmlns:a16="http://schemas.microsoft.com/office/drawing/2014/main" id="{B25C001A-6DAE-834A-91F8-35A5BB3FB962}"/>
+              </a:ext>
+            </a:extLst>
+          </p:cNvPr>
+          <p:cNvCxnSpPr>
+            <a:cxnSpLocks/>
+          </p:cNvCxnSpPr>
+          <p:nvPr/>
+        </p:nvCxnSpPr>
+        <p:spPr>
+          <a:xfrm flipV="1">
+            <a:off x="3489776" y="5224225"/>
+            <a:ext cx="0" cy="706873"/>
+          </a:xfrm>
+          <a:prstGeom prst="straightConnector1">
+            <a:avLst/>
+          </a:prstGeom>
+          <a:ln>
+            <a:solidFill>
+              <a:srgbClr val="C00000"/>
+            </a:solidFill>
+            <a:tailEnd type="triangle"/>
+          </a:ln>
+        </p:spPr>
+        <p:style>
+          <a:lnRef idx="1">
+            <a:schemeClr val="accent1"/>
+          </a:lnRef>
+          <a:fillRef idx="0">
+            <a:schemeClr val="accent1"/>
+          </a:fillRef>
+          <a:effectRef idx="0">
+            <a:schemeClr val="accent1"/>
+          </a:effectRef>
+          <a:fontRef idx="minor">
+            <a:schemeClr val="tx1"/>
+          </a:fontRef>
+        </p:style>
+      </p:cxnSp>
+      <p:sp>
+        <p:nvSpPr>
+          <p:cNvPr id="53" name="Rectangle 52">
+            <a:extLst>
+              <a:ext uri="{FF2B5EF4-FFF2-40B4-BE49-F238E27FC236}">
+                <a16:creationId xmlns:a16="http://schemas.microsoft.com/office/drawing/2014/main" id="{D8C0AE74-5646-1C44-92D1-C6ABF1AC4301}"/>
+              </a:ext>
+            </a:extLst>
+          </p:cNvPr>
+          <p:cNvSpPr/>
+          <p:nvPr/>
+        </p:nvSpPr>
+        <p:spPr>
+          <a:xfrm>
+            <a:off x="387404" y="3811856"/>
+            <a:ext cx="11364686" cy="618187"/>
+          </a:xfrm>
+          <a:prstGeom prst="rect">
+            <a:avLst/>
+          </a:prstGeom>
+          <a:noFill/>
+          <a:ln>
+            <a:solidFill>
+              <a:schemeClr val="tx1"/>
+            </a:solidFill>
+          </a:ln>
+        </p:spPr>
+        <p:style>
+          <a:lnRef idx="2">
+            <a:schemeClr val="accent1">
+              <a:shade val="50000"/>
+            </a:schemeClr>
+          </a:lnRef>
+          <a:fillRef idx="1">
+            <a:schemeClr val="accent1"/>
+          </a:fillRef>
+          <a:effectRef idx="0">
+            <a:schemeClr val="accent1"/>
+          </a:effectRef>
+          <a:fontRef idx="minor">
+            <a:schemeClr val="lt1"/>
+          </a:fontRef>
+        </p:style>
+        <p:txBody>
+          <a:bodyPr rtlCol="0" anchor="ctr"/>
+          <a:lstStyle/>
+          <a:p>
+            <a:pPr algn="ctr"/>
+            <a:endParaRPr lang="en-US"/>
+          </a:p>
+        </p:txBody>
+      </p:sp>
+      <p:graphicFrame>
+        <p:nvGraphicFramePr>
+          <p:cNvPr id="54" name="Table 53">
+            <a:extLst>
+              <a:ext uri="{FF2B5EF4-FFF2-40B4-BE49-F238E27FC236}">
+                <a16:creationId xmlns:a16="http://schemas.microsoft.com/office/drawing/2014/main" id="{2EDD35D2-43E3-9349-951C-A91A0E6A42D5}"/>
+              </a:ext>
+            </a:extLst>
+          </p:cNvPr>
+          <p:cNvGraphicFramePr>
+            <a:graphicFrameLocks noGrp="1"/>
+          </p:cNvGraphicFramePr>
+          <p:nvPr>
+            <p:extLst>
+              <p:ext uri="{D42A27DB-BD31-4B8C-83A1-F6EECF244321}">
+                <p14:modId xmlns:p14="http://schemas.microsoft.com/office/powerpoint/2010/main" val="159833520"/>
+              </p:ext>
+            </p:extLst>
+          </p:nvPr>
+        </p:nvGraphicFramePr>
+        <p:xfrm>
+          <a:off x="2530836" y="3907975"/>
+          <a:ext cx="1907416" cy="410363"/>
+        </p:xfrm>
+        <a:graphic>
+          <a:graphicData uri="http://schemas.openxmlformats.org/drawingml/2006/table">
+            <a:tbl>
+              <a:tblPr>
+                <a:tableStyleId>{638B1855-1B75-4FBE-930C-398BA8C253C6}</a:tableStyleId>
+              </a:tblPr>
+              <a:tblGrid>
+                <a:gridCol w="1907416">
+                  <a:extLst>
+                    <a:ext uri="{9D8B030D-6E8A-4147-A177-3AD203B41FA5}">
+                      <a16:colId xmlns:a16="http://schemas.microsoft.com/office/drawing/2014/main" val="4240773277"/>
+                    </a:ext>
+                  </a:extLst>
+                </a:gridCol>
+              </a:tblGrid>
+              <a:tr h="410363">
+                <a:tc>
+                  <a:txBody>
+                    <a:bodyPr/>
+                    <a:lstStyle/>
+                    <a:p>
+                      <a:pPr algn="ctr"/>
+                      <a:r>
+                        <a:rPr lang="en-SG" u="sng" dirty="0"/>
+                        <a:t>ch1:String</a:t>
+                      </a:r>
+                      <a:endParaRPr lang="en-SG" sz="1600" u="sng" dirty="0"/>
+                    </a:p>
+                  </a:txBody>
+                  <a:tcPr>
+                    <a:solidFill>
+                      <a:schemeClr val="accent5">
+                        <a:lumMod val="60000"/>
+                        <a:lumOff val="40000"/>
+                      </a:schemeClr>
+                    </a:solidFill>
+                  </a:tcPr>
+                </a:tc>
+                <a:extLst>
+                  <a:ext uri="{0D108BD9-81ED-4DB2-BD59-A6C34878D82A}">
+                    <a16:rowId xmlns:a16="http://schemas.microsoft.com/office/drawing/2014/main" val="2194462629"/>
+                  </a:ext>
+                </a:extLst>
+              </a:tr>
+            </a:tbl>
+          </a:graphicData>
+        </a:graphic>
+      </p:graphicFrame>
+      <p:graphicFrame>
+        <p:nvGraphicFramePr>
+          <p:cNvPr id="55" name="Table 54">
+            <a:extLst>
+              <a:ext uri="{FF2B5EF4-FFF2-40B4-BE49-F238E27FC236}">
+                <a16:creationId xmlns:a16="http://schemas.microsoft.com/office/drawing/2014/main" id="{4A24F389-74F9-7647-8252-1F5465549365}"/>
+              </a:ext>
+            </a:extLst>
+          </p:cNvPr>
+          <p:cNvGraphicFramePr>
+            <a:graphicFrameLocks noGrp="1"/>
+          </p:cNvGraphicFramePr>
+          <p:nvPr>
+            <p:extLst>
+              <p:ext uri="{D42A27DB-BD31-4B8C-83A1-F6EECF244321}">
+                <p14:modId xmlns:p14="http://schemas.microsoft.com/office/powerpoint/2010/main" val="634027949"/>
+              </p:ext>
+            </p:extLst>
+          </p:nvPr>
+        </p:nvGraphicFramePr>
+        <p:xfrm>
+          <a:off x="450797" y="3901502"/>
+          <a:ext cx="1967027" cy="410363"/>
+        </p:xfrm>
+        <a:graphic>
+          <a:graphicData uri="http://schemas.openxmlformats.org/drawingml/2006/table">
+            <a:tbl>
+              <a:tblPr>
+                <a:tableStyleId>{638B1855-1B75-4FBE-930C-398BA8C253C6}</a:tableStyleId>
+              </a:tblPr>
+              <a:tblGrid>
+                <a:gridCol w="1967027">
+                  <a:extLst>
+                    <a:ext uri="{9D8B030D-6E8A-4147-A177-3AD203B41FA5}">
+                      <a16:colId xmlns:a16="http://schemas.microsoft.com/office/drawing/2014/main" val="4240773277"/>
+                    </a:ext>
+                  </a:extLst>
+                </a:gridCol>
+              </a:tblGrid>
+              <a:tr h="410363">
+                <a:tc>
+                  <a:txBody>
+                    <a:bodyPr/>
+                    <a:lstStyle/>
+                    <a:p>
+                      <a:pPr algn="ctr"/>
+                      <a:r>
+                        <a:rPr lang="en-SG" u="sng" dirty="0"/>
+                        <a:t>ch0:String</a:t>
+                      </a:r>
+                      <a:endParaRPr lang="en-SG" sz="1600" u="sng" dirty="0"/>
+                    </a:p>
+                  </a:txBody>
+                  <a:tcPr>
+                    <a:solidFill>
+                      <a:schemeClr val="accent5">
+                        <a:lumMod val="60000"/>
+                        <a:lumOff val="40000"/>
+                      </a:schemeClr>
+                    </a:solidFill>
+                  </a:tcPr>
+                </a:tc>
+                <a:extLst>
+                  <a:ext uri="{0D108BD9-81ED-4DB2-BD59-A6C34878D82A}">
+                    <a16:rowId xmlns:a16="http://schemas.microsoft.com/office/drawing/2014/main" val="2194462629"/>
+                  </a:ext>
+                </a:extLst>
+              </a:tr>
+            </a:tbl>
+          </a:graphicData>
+        </a:graphic>
+      </p:graphicFrame>
+      <p:graphicFrame>
+        <p:nvGraphicFramePr>
+          <p:cNvPr id="56" name="Table 55">
+            <a:extLst>
+              <a:ext uri="{FF2B5EF4-FFF2-40B4-BE49-F238E27FC236}">
+                <a16:creationId xmlns:a16="http://schemas.microsoft.com/office/drawing/2014/main" id="{B44E1234-C078-B843-AC6B-E54F0CCDAF74}"/>
+              </a:ext>
+            </a:extLst>
+          </p:cNvPr>
+          <p:cNvGraphicFramePr>
+            <a:graphicFrameLocks noGrp="1"/>
+          </p:cNvGraphicFramePr>
+          <p:nvPr>
+            <p:extLst>
+              <p:ext uri="{D42A27DB-BD31-4B8C-83A1-F6EECF244321}">
+                <p14:modId xmlns:p14="http://schemas.microsoft.com/office/powerpoint/2010/main" val="3177432313"/>
+              </p:ext>
+            </p:extLst>
+          </p:nvPr>
+        </p:nvGraphicFramePr>
+        <p:xfrm>
+          <a:off x="4554439" y="3915767"/>
+          <a:ext cx="1907416" cy="410363"/>
+        </p:xfrm>
+        <a:graphic>
+          <a:graphicData uri="http://schemas.openxmlformats.org/drawingml/2006/table">
+            <a:tbl>
+              <a:tblPr>
+                <a:tableStyleId>{638B1855-1B75-4FBE-930C-398BA8C253C6}</a:tableStyleId>
+              </a:tblPr>
+              <a:tblGrid>
+                <a:gridCol w="1907416">
+                  <a:extLst>
+                    <a:ext uri="{9D8B030D-6E8A-4147-A177-3AD203B41FA5}">
+                      <a16:colId xmlns:a16="http://schemas.microsoft.com/office/drawing/2014/main" val="4240773277"/>
+                    </a:ext>
+                  </a:extLst>
+                </a:gridCol>
+              </a:tblGrid>
+              <a:tr h="410363">
+                <a:tc>
+                  <a:txBody>
+                    <a:bodyPr/>
+                    <a:lstStyle/>
+                    <a:p>
+                      <a:pPr algn="ctr"/>
+                      <a:r>
+                        <a:rPr lang="en-SG" u="sng" dirty="0"/>
+                        <a:t>ch2:String</a:t>
+                      </a:r>
+                      <a:endParaRPr lang="en-SG" sz="1600" u="sng" dirty="0"/>
+                    </a:p>
+                  </a:txBody>
+                  <a:tcPr>
+                    <a:solidFill>
+                      <a:schemeClr val="accent5">
+                        <a:lumMod val="60000"/>
+                        <a:lumOff val="40000"/>
+                      </a:schemeClr>
+                    </a:solidFill>
+                  </a:tcPr>
+                </a:tc>
+                <a:extLst>
+                  <a:ext uri="{0D108BD9-81ED-4DB2-BD59-A6C34878D82A}">
+                    <a16:rowId xmlns:a16="http://schemas.microsoft.com/office/drawing/2014/main" val="2194462629"/>
+                  </a:ext>
+                </a:extLst>
+              </a:tr>
+            </a:tbl>
+          </a:graphicData>
+        </a:graphic>
+      </p:graphicFrame>
+      <p:sp>
+        <p:nvSpPr>
+          <p:cNvPr id="57" name="Rectangle 56">
+            <a:extLst>
+              <a:ext uri="{FF2B5EF4-FFF2-40B4-BE49-F238E27FC236}">
+                <a16:creationId xmlns:a16="http://schemas.microsoft.com/office/drawing/2014/main" id="{884C1D96-0A15-1F45-9722-0476D3E39657}"/>
+              </a:ext>
+            </a:extLst>
+          </p:cNvPr>
+          <p:cNvSpPr/>
+          <p:nvPr/>
+        </p:nvSpPr>
+        <p:spPr>
+          <a:xfrm>
+            <a:off x="358937" y="573761"/>
+            <a:ext cx="11364686" cy="618187"/>
+          </a:xfrm>
+          <a:prstGeom prst="rect">
+            <a:avLst/>
+          </a:prstGeom>
+          <a:noFill/>
+          <a:ln>
+            <a:solidFill>
+              <a:schemeClr val="tx1"/>
+            </a:solidFill>
+          </a:ln>
+        </p:spPr>
+        <p:style>
+          <a:lnRef idx="2">
+            <a:schemeClr val="accent1">
+              <a:shade val="50000"/>
+            </a:schemeClr>
+          </a:lnRef>
+          <a:fillRef idx="1">
+            <a:schemeClr val="accent1"/>
+          </a:fillRef>
+          <a:effectRef idx="0">
+            <a:schemeClr val="accent1"/>
+          </a:effectRef>
+          <a:fontRef idx="minor">
+            <a:schemeClr val="lt1"/>
+          </a:fontRef>
+        </p:style>
+        <p:txBody>
+          <a:bodyPr rtlCol="0" anchor="ctr"/>
+          <a:lstStyle/>
+          <a:p>
+            <a:pPr algn="ctr"/>
+            <a:endParaRPr lang="en-US"/>
+          </a:p>
+        </p:txBody>
+      </p:sp>
+      <p:graphicFrame>
+        <p:nvGraphicFramePr>
+          <p:cNvPr id="58" name="Table 57">
+            <a:extLst>
+              <a:ext uri="{FF2B5EF4-FFF2-40B4-BE49-F238E27FC236}">
+                <a16:creationId xmlns:a16="http://schemas.microsoft.com/office/drawing/2014/main" id="{10236D50-8837-0148-AD2D-D52EF196F2A0}"/>
+              </a:ext>
+            </a:extLst>
+          </p:cNvPr>
+          <p:cNvGraphicFramePr>
+            <a:graphicFrameLocks noGrp="1"/>
+          </p:cNvGraphicFramePr>
+          <p:nvPr>
+            <p:extLst>
+              <p:ext uri="{D42A27DB-BD31-4B8C-83A1-F6EECF244321}">
+                <p14:modId xmlns:p14="http://schemas.microsoft.com/office/powerpoint/2010/main" val="1882932739"/>
+              </p:ext>
+            </p:extLst>
+          </p:nvPr>
+        </p:nvGraphicFramePr>
+        <p:xfrm>
+          <a:off x="2502369" y="669880"/>
+          <a:ext cx="1907416" cy="410363"/>
+        </p:xfrm>
+        <a:graphic>
+          <a:graphicData uri="http://schemas.openxmlformats.org/drawingml/2006/table">
+            <a:tbl>
+              <a:tblPr>
+                <a:tableStyleId>{638B1855-1B75-4FBE-930C-398BA8C253C6}</a:tableStyleId>
+              </a:tblPr>
+              <a:tblGrid>
+                <a:gridCol w="1907416">
+                  <a:extLst>
+                    <a:ext uri="{9D8B030D-6E8A-4147-A177-3AD203B41FA5}">
+                      <a16:colId xmlns:a16="http://schemas.microsoft.com/office/drawing/2014/main" val="4240773277"/>
+                    </a:ext>
+                  </a:extLst>
+                </a:gridCol>
+              </a:tblGrid>
+              <a:tr h="410363">
+                <a:tc>
+                  <a:txBody>
+                    <a:bodyPr/>
+                    <a:lstStyle/>
+                    <a:p>
+                      <a:pPr algn="ctr"/>
+                      <a:r>
+                        <a:rPr lang="en-SG" u="sng" dirty="0"/>
+                        <a:t>ch1:String</a:t>
+                      </a:r>
+                      <a:endParaRPr lang="en-SG" sz="1600" u="sng" dirty="0"/>
+                    </a:p>
+                  </a:txBody>
+                  <a:tcPr>
+                    <a:solidFill>
+                      <a:schemeClr val="accent5">
+                        <a:lumMod val="60000"/>
+                        <a:lumOff val="40000"/>
+                      </a:schemeClr>
+                    </a:solidFill>
+                  </a:tcPr>
+                </a:tc>
+                <a:extLst>
+                  <a:ext uri="{0D108BD9-81ED-4DB2-BD59-A6C34878D82A}">
+                    <a16:rowId xmlns:a16="http://schemas.microsoft.com/office/drawing/2014/main" val="2194462629"/>
+                  </a:ext>
+                </a:extLst>
+              </a:tr>
+            </a:tbl>
+          </a:graphicData>
+        </a:graphic>
+      </p:graphicFrame>
+      <p:graphicFrame>
+        <p:nvGraphicFramePr>
+          <p:cNvPr id="59" name="Table 58">
+            <a:extLst>
+              <a:ext uri="{FF2B5EF4-FFF2-40B4-BE49-F238E27FC236}">
+                <a16:creationId xmlns:a16="http://schemas.microsoft.com/office/drawing/2014/main" id="{90B8ACF9-9167-9941-9CC4-464AE22DBEB5}"/>
+              </a:ext>
+            </a:extLst>
+          </p:cNvPr>
+          <p:cNvGraphicFramePr>
+            <a:graphicFrameLocks noGrp="1"/>
+          </p:cNvGraphicFramePr>
+          <p:nvPr>
+            <p:extLst>
+              <p:ext uri="{D42A27DB-BD31-4B8C-83A1-F6EECF244321}">
+                <p14:modId xmlns:p14="http://schemas.microsoft.com/office/powerpoint/2010/main" val="1354228808"/>
+              </p:ext>
+            </p:extLst>
+          </p:nvPr>
+        </p:nvGraphicFramePr>
+        <p:xfrm>
+          <a:off x="422330" y="663407"/>
+          <a:ext cx="1967027" cy="410363"/>
+        </p:xfrm>
+        <a:graphic>
+          <a:graphicData uri="http://schemas.openxmlformats.org/drawingml/2006/table">
+            <a:tbl>
+              <a:tblPr>
+                <a:tableStyleId>{638B1855-1B75-4FBE-930C-398BA8C253C6}</a:tableStyleId>
+              </a:tblPr>
+              <a:tblGrid>
+                <a:gridCol w="1967027">
+                  <a:extLst>
+                    <a:ext uri="{9D8B030D-6E8A-4147-A177-3AD203B41FA5}">
+                      <a16:colId xmlns:a16="http://schemas.microsoft.com/office/drawing/2014/main" val="4240773277"/>
+                    </a:ext>
+                  </a:extLst>
+                </a:gridCol>
+              </a:tblGrid>
+              <a:tr h="410363">
+                <a:tc>
+                  <a:txBody>
+                    <a:bodyPr/>
+                    <a:lstStyle/>
+                    <a:p>
+                      <a:pPr algn="ctr"/>
+                      <a:r>
+                        <a:rPr lang="en-SG" u="sng" dirty="0"/>
+                        <a:t>ch0:String</a:t>
+                      </a:r>
+                      <a:endParaRPr lang="en-SG" sz="1600" u="sng" dirty="0"/>
+                    </a:p>
+                  </a:txBody>
+                  <a:tcPr>
+                    <a:solidFill>
+                      <a:schemeClr val="accent5">
+                        <a:lumMod val="60000"/>
+                        <a:lumOff val="40000"/>
+                      </a:schemeClr>
+                    </a:solidFill>
+                  </a:tcPr>
+                </a:tc>
+                <a:extLst>
+                  <a:ext uri="{0D108BD9-81ED-4DB2-BD59-A6C34878D82A}">
+                    <a16:rowId xmlns:a16="http://schemas.microsoft.com/office/drawing/2014/main" val="2194462629"/>
+                  </a:ext>
+                </a:extLst>
+              </a:tr>
+            </a:tbl>
+          </a:graphicData>
+        </a:graphic>
+      </p:graphicFrame>
+      <p:graphicFrame>
+        <p:nvGraphicFramePr>
+          <p:cNvPr id="60" name="Table 59">
+            <a:extLst>
+              <a:ext uri="{FF2B5EF4-FFF2-40B4-BE49-F238E27FC236}">
+                <a16:creationId xmlns:a16="http://schemas.microsoft.com/office/drawing/2014/main" id="{29E1D926-4D27-5548-9256-038628B8899D}"/>
+              </a:ext>
+            </a:extLst>
+          </p:cNvPr>
+          <p:cNvGraphicFramePr>
+            <a:graphicFrameLocks noGrp="1"/>
+          </p:cNvGraphicFramePr>
+          <p:nvPr>
+            <p:extLst>
+              <p:ext uri="{D42A27DB-BD31-4B8C-83A1-F6EECF244321}">
+                <p14:modId xmlns:p14="http://schemas.microsoft.com/office/powerpoint/2010/main" val="465845811"/>
+              </p:ext>
+            </p:extLst>
+          </p:nvPr>
+        </p:nvGraphicFramePr>
+        <p:xfrm>
+          <a:off x="4525972" y="677672"/>
+          <a:ext cx="1907416" cy="410363"/>
+        </p:xfrm>
+        <a:graphic>
+          <a:graphicData uri="http://schemas.openxmlformats.org/drawingml/2006/table">
+            <a:tbl>
+              <a:tblPr>
+                <a:tableStyleId>{638B1855-1B75-4FBE-930C-398BA8C253C6}</a:tableStyleId>
+              </a:tblPr>
+              <a:tblGrid>
+                <a:gridCol w="1907416">
+                  <a:extLst>
+                    <a:ext uri="{9D8B030D-6E8A-4147-A177-3AD203B41FA5}">
+                      <a16:colId xmlns:a16="http://schemas.microsoft.com/office/drawing/2014/main" val="4240773277"/>
+                    </a:ext>
+                  </a:extLst>
+                </a:gridCol>
+              </a:tblGrid>
+              <a:tr h="410363">
+                <a:tc>
+                  <a:txBody>
+                    <a:bodyPr/>
+                    <a:lstStyle/>
+                    <a:p>
+                      <a:pPr algn="ctr"/>
+                      <a:r>
+                        <a:rPr lang="en-SG" u="sng" dirty="0"/>
+                        <a:t>ch2:String</a:t>
+                      </a:r>
+                      <a:endParaRPr lang="en-SG" sz="1600" u="sng" dirty="0"/>
+                    </a:p>
+                  </a:txBody>
+                  <a:tcPr>
+                    <a:solidFill>
+                      <a:schemeClr val="accent5">
+                        <a:lumMod val="60000"/>
+                        <a:lumOff val="40000"/>
+                      </a:schemeClr>
+                    </a:solidFill>
+                  </a:tcPr>
+                </a:tc>
+                <a:extLst>
+                  <a:ext uri="{0D108BD9-81ED-4DB2-BD59-A6C34878D82A}">
+                    <a16:rowId xmlns:a16="http://schemas.microsoft.com/office/drawing/2014/main" val="2194462629"/>
+                  </a:ext>
+                </a:extLst>
+              </a:tr>
+            </a:tbl>
+          </a:graphicData>
+        </a:graphic>
+      </p:graphicFrame>
+      <p:sp>
+        <p:nvSpPr>
+          <p:cNvPr id="61" name="Rectangle 60">
+            <a:extLst>
+              <a:ext uri="{FF2B5EF4-FFF2-40B4-BE49-F238E27FC236}">
+                <a16:creationId xmlns:a16="http://schemas.microsoft.com/office/drawing/2014/main" id="{53365B5C-2466-0946-ACB0-4CC74A5C103C}"/>
+              </a:ext>
+            </a:extLst>
+          </p:cNvPr>
+          <p:cNvSpPr/>
+          <p:nvPr/>
+        </p:nvSpPr>
+        <p:spPr>
+          <a:xfrm>
+            <a:off x="358937" y="1325107"/>
+            <a:ext cx="11364686" cy="593918"/>
+          </a:xfrm>
+          <a:prstGeom prst="rect">
+            <a:avLst/>
+          </a:prstGeom>
+          <a:noFill/>
+          <a:ln>
+            <a:solidFill>
+              <a:schemeClr val="tx1"/>
+            </a:solidFill>
+          </a:ln>
+        </p:spPr>
+        <p:style>
+          <a:lnRef idx="2">
+            <a:schemeClr val="accent1">
+              <a:shade val="50000"/>
+            </a:schemeClr>
+          </a:lnRef>
+          <a:fillRef idx="1">
+            <a:schemeClr val="accent1"/>
+          </a:fillRef>
+          <a:effectRef idx="0">
+            <a:schemeClr val="accent1"/>
+          </a:effectRef>
+          <a:fontRef idx="minor">
+            <a:schemeClr val="lt1"/>
+          </a:fontRef>
+        </p:style>
+        <p:txBody>
+          <a:bodyPr rtlCol="0" anchor="ctr"/>
+          <a:lstStyle/>
+          <a:p>
+            <a:pPr algn="ctr"/>
+            <a:endParaRPr lang="en-US"/>
+          </a:p>
+        </p:txBody>
+      </p:sp>
+      <p:graphicFrame>
+        <p:nvGraphicFramePr>
+          <p:cNvPr id="62" name="Table 61">
+            <a:extLst>
+              <a:ext uri="{FF2B5EF4-FFF2-40B4-BE49-F238E27FC236}">
+                <a16:creationId xmlns:a16="http://schemas.microsoft.com/office/drawing/2014/main" id="{A0A8F8FF-8613-4A4C-9768-2E5EAC1C46E5}"/>
+              </a:ext>
+            </a:extLst>
+          </p:cNvPr>
+          <p:cNvGraphicFramePr>
+            <a:graphicFrameLocks noGrp="1"/>
+          </p:cNvGraphicFramePr>
+          <p:nvPr>
+            <p:extLst>
+              <p:ext uri="{D42A27DB-BD31-4B8C-83A1-F6EECF244321}">
+                <p14:modId xmlns:p14="http://schemas.microsoft.com/office/powerpoint/2010/main" val="1349145907"/>
+              </p:ext>
+            </p:extLst>
+          </p:nvPr>
+        </p:nvGraphicFramePr>
+        <p:xfrm>
+          <a:off x="4522797" y="1413122"/>
           <a:ext cx="1926000" cy="417888"/>
         </p:xfrm>
         <a:graphic>
@@ -3826,10 +4531,10 @@
       </p:graphicFrame>
       <p:graphicFrame>
         <p:nvGraphicFramePr>
-          <p:cNvPr id="21" name="Table 20">
-            <a:extLst>
-              <a:ext uri="{FF2B5EF4-FFF2-40B4-BE49-F238E27FC236}">
-                <a16:creationId xmlns:a16="http://schemas.microsoft.com/office/drawing/2014/main" id="{F545FAB8-F1CE-4886-9BDE-E772BCB0A9C4}"/>
+          <p:cNvPr id="63" name="Table 62">
+            <a:extLst>
+              <a:ext uri="{FF2B5EF4-FFF2-40B4-BE49-F238E27FC236}">
+                <a16:creationId xmlns:a16="http://schemas.microsoft.com/office/drawing/2014/main" id="{43A3A776-5AAF-144F-A7C5-4D893B23E235}"/>
               </a:ext>
             </a:extLst>
           </p:cNvPr>
@@ -3839,77 +4544,13 @@
           <p:nvPr>
             <p:extLst>
               <p:ext uri="{D42A27DB-BD31-4B8C-83A1-F6EECF244321}">
-                <p14:modId xmlns:p14="http://schemas.microsoft.com/office/powerpoint/2010/main" val="1456310920"/>
+                <p14:modId xmlns:p14="http://schemas.microsoft.com/office/powerpoint/2010/main" val="2793242493"/>
               </p:ext>
             </p:extLst>
           </p:nvPr>
         </p:nvGraphicFramePr>
         <p:xfrm>
-          <a:off x="473240" y="3922133"/>
-          <a:ext cx="1926000" cy="417888"/>
-        </p:xfrm>
-        <a:graphic>
-          <a:graphicData uri="http://schemas.openxmlformats.org/drawingml/2006/table">
-            <a:tbl>
-              <a:tblPr>
-                <a:tableStyleId>{638B1855-1B75-4FBE-930C-398BA8C253C6}</a:tableStyleId>
-              </a:tblPr>
-              <a:tblGrid>
-                <a:gridCol w="1926000">
-                  <a:extLst>
-                    <a:ext uri="{9D8B030D-6E8A-4147-A177-3AD203B41FA5}">
-                      <a16:colId xmlns:a16="http://schemas.microsoft.com/office/drawing/2014/main" val="4240773277"/>
-                    </a:ext>
-                  </a:extLst>
-                </a:gridCol>
-              </a:tblGrid>
-              <a:tr h="417888">
-                <a:tc>
-                  <a:txBody>
-                    <a:bodyPr/>
-                    <a:lstStyle/>
-                    <a:p>
-                      <a:r>
-                        <a:rPr lang="en-SG" u="sng" dirty="0"/>
-                        <a:t>cc0:CardCollection</a:t>
-                      </a:r>
-                      <a:endParaRPr lang="en-SG" sz="1600" u="sng" dirty="0"/>
-                    </a:p>
-                  </a:txBody>
-                  <a:tcPr/>
-                </a:tc>
-                <a:extLst>
-                  <a:ext uri="{0D108BD9-81ED-4DB2-BD59-A6C34878D82A}">
-                    <a16:rowId xmlns:a16="http://schemas.microsoft.com/office/drawing/2014/main" val="2194462629"/>
-                  </a:ext>
-                </a:extLst>
-              </a:tr>
-            </a:tbl>
-          </a:graphicData>
-        </a:graphic>
-      </p:graphicFrame>
-      <p:graphicFrame>
-        <p:nvGraphicFramePr>
-          <p:cNvPr id="22" name="Table 21">
-            <a:extLst>
-              <a:ext uri="{FF2B5EF4-FFF2-40B4-BE49-F238E27FC236}">
-                <a16:creationId xmlns:a16="http://schemas.microsoft.com/office/drawing/2014/main" id="{F545FAB8-F1CE-4886-9BDE-E772BCB0A9C4}"/>
-              </a:ext>
-            </a:extLst>
-          </p:cNvPr>
-          <p:cNvGraphicFramePr>
-            <a:graphicFrameLocks noGrp="1"/>
-          </p:cNvGraphicFramePr>
-          <p:nvPr>
-            <p:extLst>
-              <p:ext uri="{D42A27DB-BD31-4B8C-83A1-F6EECF244321}">
-                <p14:modId xmlns:p14="http://schemas.microsoft.com/office/powerpoint/2010/main" val="1813082551"/>
-              </p:ext>
-            </p:extLst>
-          </p:nvPr>
-        </p:nvGraphicFramePr>
-        <p:xfrm>
-          <a:off x="2440458" y="3922133"/>
+          <a:off x="2483785" y="1394983"/>
           <a:ext cx="1926000" cy="417888"/>
         </p:xfrm>
         <a:graphic>
@@ -3954,10 +4595,10 @@
       </p:graphicFrame>
       <p:graphicFrame>
         <p:nvGraphicFramePr>
-          <p:cNvPr id="23" name="Table 22">
-            <a:extLst>
-              <a:ext uri="{FF2B5EF4-FFF2-40B4-BE49-F238E27FC236}">
-                <a16:creationId xmlns:a16="http://schemas.microsoft.com/office/drawing/2014/main" id="{F545FAB8-F1CE-4886-9BDE-E772BCB0A9C4}"/>
+          <p:cNvPr id="64" name="Table 63">
+            <a:extLst>
+              <a:ext uri="{FF2B5EF4-FFF2-40B4-BE49-F238E27FC236}">
+                <a16:creationId xmlns:a16="http://schemas.microsoft.com/office/drawing/2014/main" id="{9D07BC68-9F00-6C42-970B-C6125248E52F}"/>
               </a:ext>
             </a:extLst>
           </p:cNvPr>
@@ -3967,13 +4608,13 @@
           <p:nvPr>
             <p:extLst>
               <p:ext uri="{D42A27DB-BD31-4B8C-83A1-F6EECF244321}">
-                <p14:modId xmlns:p14="http://schemas.microsoft.com/office/powerpoint/2010/main" val="4048999844"/>
+                <p14:modId xmlns:p14="http://schemas.microsoft.com/office/powerpoint/2010/main" val="3140410474"/>
               </p:ext>
             </p:extLst>
           </p:nvPr>
         </p:nvGraphicFramePr>
         <p:xfrm>
-          <a:off x="4409785" y="3922133"/>
+          <a:off x="444773" y="1394983"/>
           <a:ext cx="1926000" cy="417888"/>
         </p:xfrm>
         <a:graphic>
@@ -3999,7 +4640,7 @@
                     <a:p>
                       <a:r>
                         <a:rPr lang="en-SG" u="sng" dirty="0"/>
-                        <a:t>cc2:CardCollection</a:t>
+                        <a:t>cc0:CardCollection</a:t>
                       </a:r>
                       <a:endParaRPr lang="en-SG" sz="1600" u="sng" dirty="0"/>
                     </a:p>
@@ -4016,94 +4657,6 @@
           </a:graphicData>
         </a:graphic>
       </p:graphicFrame>
-      <p:cxnSp>
-        <p:nvCxnSpPr>
-          <p:cNvPr id="19" name="Straight Arrow Connector 18">
-            <a:extLst>
-              <a:ext uri="{FF2B5EF4-FFF2-40B4-BE49-F238E27FC236}">
-                <a16:creationId xmlns:a16="http://schemas.microsoft.com/office/drawing/2014/main" id="{DC8F2CFA-FFF8-41BD-B884-8ACDF8C96486}"/>
-              </a:ext>
-            </a:extLst>
-          </p:cNvPr>
-          <p:cNvCxnSpPr>
-            <a:cxnSpLocks/>
-          </p:cNvCxnSpPr>
-          <p:nvPr/>
-        </p:nvCxnSpPr>
-        <p:spPr>
-          <a:xfrm flipV="1">
-            <a:off x="5377343" y="2019157"/>
-            <a:ext cx="0" cy="706873"/>
-          </a:xfrm>
-          <a:prstGeom prst="straightConnector1">
-            <a:avLst/>
-          </a:prstGeom>
-          <a:ln>
-            <a:solidFill>
-              <a:srgbClr val="C00000"/>
-            </a:solidFill>
-            <a:tailEnd type="triangle"/>
-          </a:ln>
-        </p:spPr>
-        <p:style>
-          <a:lnRef idx="1">
-            <a:schemeClr val="accent1"/>
-          </a:lnRef>
-          <a:fillRef idx="0">
-            <a:schemeClr val="accent1"/>
-          </a:fillRef>
-          <a:effectRef idx="0">
-            <a:schemeClr val="accent1"/>
-          </a:effectRef>
-          <a:fontRef idx="minor">
-            <a:schemeClr val="tx1"/>
-          </a:fontRef>
-        </p:style>
-      </p:cxnSp>
-      <p:cxnSp>
-        <p:nvCxnSpPr>
-          <p:cNvPr id="25" name="Straight Arrow Connector 24">
-            <a:extLst>
-              <a:ext uri="{FF2B5EF4-FFF2-40B4-BE49-F238E27FC236}">
-                <a16:creationId xmlns:a16="http://schemas.microsoft.com/office/drawing/2014/main" id="{CC39FF7A-ED45-4697-B75C-01E9C1C55F2A}"/>
-              </a:ext>
-            </a:extLst>
-          </p:cNvPr>
-          <p:cNvCxnSpPr>
-            <a:cxnSpLocks/>
-          </p:cNvCxnSpPr>
-          <p:nvPr/>
-        </p:nvCxnSpPr>
-        <p:spPr>
-          <a:xfrm flipV="1">
-            <a:off x="3380763" y="4504888"/>
-            <a:ext cx="0" cy="730001"/>
-          </a:xfrm>
-          <a:prstGeom prst="straightConnector1">
-            <a:avLst/>
-          </a:prstGeom>
-          <a:ln>
-            <a:solidFill>
-              <a:srgbClr val="C00000"/>
-            </a:solidFill>
-            <a:tailEnd type="triangle"/>
-          </a:ln>
-        </p:spPr>
-        <p:style>
-          <a:lnRef idx="1">
-            <a:schemeClr val="accent1"/>
-          </a:lnRef>
-          <a:fillRef idx="0">
-            <a:schemeClr val="accent1"/>
-          </a:fillRef>
-          <a:effectRef idx="0">
-            <a:schemeClr val="accent1"/>
-          </a:effectRef>
-          <a:fontRef idx="minor">
-            <a:schemeClr val="tx1"/>
-          </a:fontRef>
-        </p:style>
-      </p:cxnSp>
     </p:spTree>
     <p:extLst>
       <p:ext uri="{BB962C8B-B14F-4D97-AF65-F5344CB8AC3E}">

</xml_diff>